<commit_message>
MDAnalysis SPIDAL tutorial was moved to https://github.com/MDAnalysis/SPIDAL-MDAnalysis-Midas-tutorial
Changed all paths to the github repo and to the documentation pages.
Note that there is currently a SSL issue that makes web browsers pop
up a warning when accessing http://www.mdanalysis.org/SPIDAL-MDAnalysis-Midas-tutorial/ ; see
https://github.com/MDAnalysis/SPIDAL-MDAnalysis-Midas-tutorial/issues/5
</commit_message>
<xml_diff>
--- a/Slides/MIDAS-BioSim-Tutorial.pptx
+++ b/Slides/MIDAS-BioSim-Tutorial.pptx
@@ -449,6 +449,11 @@
         </p:txBody>
       </p:sp>
     </p:spTree>
+    <p:extLst>
+      <p:ext uri="{BB962C8B-B14F-4D97-AF65-F5344CB8AC3E}">
+        <p14:creationId xmlns:p14="http://schemas.microsoft.com/office/powerpoint/2010/main" val="3921692170"/>
+      </p:ext>
+    </p:extLst>
   </p:cSld>
   <p:clrMap bg1="lt1" tx1="dk1" bg2="dk2" tx2="lt2" accent1="accent1" accent2="accent2" accent3="accent3" accent4="accent4" accent5="accent5" accent6="accent6" hlink="hlink" folHlink="folHlink"/>
   <p:notesStyle>
@@ -4708,14 +4713,14 @@
             <a:noFill/>
           </a:ln>
           <a:extLst>
-            <a:ext uri="{909E8E84-426E-40DD-AFC4-6F175D3DCCD1}">
+            <a:ext uri="{909E8E84-426E-40dd-AFC4-6F175D3DCCD1}">
               <a14:hiddenFill xmlns:a14="http://schemas.microsoft.com/office/drawing/2010/main">
                 <a:solidFill>
                   <a:srgbClr val="FFFFFF"/>
                 </a:solidFill>
               </a14:hiddenFill>
             </a:ext>
-            <a:ext uri="{91240B29-F687-4F45-9708-019B960494DF}">
+            <a:ext uri="{91240B29-F687-4f45-9708-019B960494DF}">
               <a14:hiddenLine xmlns:a14="http://schemas.microsoft.com/office/drawing/2010/main" w="9525">
                 <a:solidFill>
                   <a:srgbClr val="000000"/>
@@ -4767,14 +4772,14 @@
             <a:noFill/>
           </a:ln>
           <a:extLst>
-            <a:ext uri="{909E8E84-426E-40DD-AFC4-6F175D3DCCD1}">
+            <a:ext uri="{909E8E84-426E-40dd-AFC4-6F175D3DCCD1}">
               <a14:hiddenFill xmlns:a14="http://schemas.microsoft.com/office/drawing/2010/main">
                 <a:solidFill>
                   <a:srgbClr val="FFFFFF"/>
                 </a:solidFill>
               </a14:hiddenFill>
             </a:ext>
-            <a:ext uri="{91240B29-F687-4F45-9708-019B960494DF}">
+            <a:ext uri="{91240B29-F687-4f45-9708-019B960494DF}">
               <a14:hiddenLine xmlns:a14="http://schemas.microsoft.com/office/drawing/2010/main" w="9525">
                 <a:solidFill>
                   <a:srgbClr val="000000"/>
@@ -6073,7 +6078,7 @@
   <p:clrMapOvr>
     <a:masterClrMapping/>
   </p:clrMapOvr>
-  <p:transition spd="slow">
+  <p:transition xmlns:p14="http://schemas.microsoft.com/office/powerpoint/2010/main" spd="slow">
     <p:fade/>
   </p:transition>
 </p:sld>
@@ -6329,7 +6334,7 @@
   <p:clrMapOvr>
     <a:masterClrMapping/>
   </p:clrMapOvr>
-  <p:transition spd="slow">
+  <p:transition xmlns:p14="http://schemas.microsoft.com/office/powerpoint/2010/main" spd="slow">
     <p:fade/>
   </p:transition>
 </p:sld>
@@ -6502,7 +6507,7 @@
   <p:clrMapOvr>
     <a:masterClrMapping/>
   </p:clrMapOvr>
-  <p:transition spd="slow">
+  <p:transition xmlns:p14="http://schemas.microsoft.com/office/powerpoint/2010/main" spd="slow">
     <p:fade/>
   </p:transition>
 </p:sld>
@@ -6732,7 +6737,7 @@
   <p:clrMapOvr>
     <a:masterClrMapping/>
   </p:clrMapOvr>
-  <p:transition spd="slow">
+  <p:transition xmlns:p14="http://schemas.microsoft.com/office/powerpoint/2010/main" spd="slow">
     <p:fade/>
   </p:transition>
 </p:sld>
@@ -6954,7 +6959,7 @@
   <p:clrMapOvr>
     <a:masterClrMapping/>
   </p:clrMapOvr>
-  <p:transition spd="slow">
+  <p:transition xmlns:p14="http://schemas.microsoft.com/office/powerpoint/2010/main" spd="slow">
     <p:fade/>
   </p:transition>
 </p:sld>
@@ -7093,7 +7098,7 @@
   <p:clrMapOvr>
     <a:masterClrMapping/>
   </p:clrMapOvr>
-  <p:transition spd="slow">
+  <p:transition xmlns:p14="http://schemas.microsoft.com/office/powerpoint/2010/main" spd="slow">
     <p:fade/>
   </p:transition>
 </p:sld>
@@ -9814,13 +9819,13 @@
   <p:clrMapOvr>
     <a:masterClrMapping/>
   </p:clrMapOvr>
-  <p:transition spd="slow">
+  <p:transition xmlns:p14="http://schemas.microsoft.com/office/powerpoint/2010/main" spd="slow">
     <p:fade/>
   </p:transition>
   <p:timing>
     <p:tnLst>
       <p:par>
-        <p:cTn id="1" dur="indefinite" restart="never" nodeType="tmRoot">
+        <p:cTn xmlns:p14="http://schemas.microsoft.com/office/powerpoint/2010/main" id="1" dur="indefinite" restart="never" nodeType="tmRoot">
           <p:childTnLst>
             <p:seq concurrent="1" nextAc="seek">
               <p:cTn id="2" dur="indefinite" nodeType="mainSeq">
@@ -11268,7 +11273,7 @@
   <p:clrMapOvr>
     <a:masterClrMapping/>
   </p:clrMapOvr>
-  <p:transition spd="slow">
+  <p:transition xmlns:p14="http://schemas.microsoft.com/office/powerpoint/2010/main" spd="slow">
     <p:fade/>
   </p:transition>
 </p:sld>
@@ -11504,7 +11509,7 @@
   <p:clrMapOvr>
     <a:masterClrMapping/>
   </p:clrMapOvr>
-  <p:transition spd="slow">
+  <p:transition xmlns:p14="http://schemas.microsoft.com/office/powerpoint/2010/main" spd="slow">
     <p:fade/>
   </p:transition>
 </p:sld>
@@ -12384,6 +12389,18 @@
               </a:rPr>
               <a:t>-Spark</a:t>
             </a:r>
+            <a:r>
+              <a:rPr lang="en" sz="3600" b="1" i="0" u="none" strike="noStrike" cap="none" dirty="0">
+                <a:solidFill>
+                  <a:srgbClr val="A50021"/>
+                </a:solidFill>
+                <a:latin typeface="Arial"/>
+                <a:ea typeface="Arial"/>
+                <a:cs typeface="Arial"/>
+                <a:sym typeface="Arial"/>
+              </a:rPr>
+              <a:t/>
+            </a:r>
             <a:br>
               <a:rPr lang="en" sz="3600" b="1" i="0" u="none" strike="noStrike" cap="none" dirty="0">
                 <a:solidFill>
@@ -12536,7 +12553,7 @@
   <p:clrMapOvr>
     <a:masterClrMapping/>
   </p:clrMapOvr>
-  <p:transition spd="slow">
+  <p:transition xmlns:p14="http://schemas.microsoft.com/office/powerpoint/2010/main" spd="slow">
     <p:fade/>
   </p:transition>
 </p:sld>
@@ -12625,7 +12642,7 @@
   <p:clrMapOvr>
     <a:masterClrMapping/>
   </p:clrMapOvr>
-  <p:transition spd="slow">
+  <p:transition xmlns:p14="http://schemas.microsoft.com/office/powerpoint/2010/main" spd="slow">
     <p:fade/>
   </p:transition>
 </p:sld>
@@ -12711,13 +12728,40 @@
               <a:buChar char="●"/>
             </a:pPr>
             <a:r>
-              <a:rPr lang="en" sz="1800" u="sng">
+              <a:rPr lang="en" sz="1800" u="sng" dirty="0" smtClean="0">
                 <a:solidFill>
                   <a:schemeClr val="hlink"/>
                 </a:solidFill>
                 <a:hlinkClick r:id="rId3"/>
               </a:rPr>
-              <a:t>https://becksteinlab.github.io/SPIDAL-MDAnalysis-Midas-tutorial/</a:t>
+              <a:t>http://</a:t>
+            </a:r>
+            <a:r>
+              <a:rPr lang="en-US" sz="1800" u="sng" dirty="0" smtClean="0">
+                <a:solidFill>
+                  <a:schemeClr val="hlink"/>
+                </a:solidFill>
+                <a:hlinkClick r:id="rId3"/>
+              </a:rPr>
+              <a:t>www.mdanalysis.org</a:t>
+            </a:r>
+            <a:r>
+              <a:rPr lang="en" sz="1800" u="sng" dirty="0" smtClean="0">
+                <a:solidFill>
+                  <a:schemeClr val="hlink"/>
+                </a:solidFill>
+                <a:hlinkClick r:id="rId3"/>
+              </a:rPr>
+              <a:t>/SPIDAL-MDAnalysis-Midas-tutorial</a:t>
+            </a:r>
+            <a:r>
+              <a:rPr lang="en" sz="1800" u="sng" dirty="0">
+                <a:solidFill>
+                  <a:schemeClr val="hlink"/>
+                </a:solidFill>
+                <a:hlinkClick r:id="rId3"/>
+              </a:rPr>
+              <a:t>/</a:t>
             </a:r>
           </a:p>
           <a:p>
@@ -12729,7 +12773,7 @@
               <a:buChar char="●"/>
             </a:pPr>
             <a:r>
-              <a:rPr lang="en" sz="1800" u="sng">
+              <a:rPr lang="en" sz="1800" u="sng" dirty="0">
                 <a:solidFill>
                   <a:schemeClr val="hlink"/>
                 </a:solidFill>
@@ -12747,7 +12791,7 @@
               <a:buChar char="●"/>
             </a:pPr>
             <a:r>
-              <a:rPr lang="en" sz="1800" u="sng">
+              <a:rPr lang="en" sz="1800" u="sng" dirty="0">
                 <a:solidFill>
                   <a:schemeClr val="hlink"/>
                 </a:solidFill>
@@ -12756,7 +12800,7 @@
               <a:t>https://github.com/Becksteinlab/SPIDAL-MDAnalysis-Midas-tutorial</a:t>
             </a:r>
             <a:r>
-              <a:rPr lang="en" sz="1800"/>
+              <a:rPr lang="en" sz="1800" dirty="0"/>
               <a:t> </a:t>
             </a:r>
           </a:p>
@@ -12767,7 +12811,7 @@
               </a:spcBef>
               <a:buNone/>
             </a:pPr>
-            <a:endParaRPr sz="1800"/>
+            <a:endParaRPr sz="1800" dirty="0"/>
           </a:p>
         </p:txBody>
       </p:sp>
@@ -12912,7 +12956,7 @@
   <p:clrMapOvr>
     <a:masterClrMapping/>
   </p:clrMapOvr>
-  <p:transition spd="slow">
+  <p:transition xmlns:p14="http://schemas.microsoft.com/office/powerpoint/2010/main" spd="slow">
     <p:fade/>
   </p:transition>
 </p:sld>
@@ -14113,7 +14157,7 @@
   <p:clrMapOvr>
     <a:masterClrMapping/>
   </p:clrMapOvr>
-  <p:transition spd="slow">
+  <p:transition xmlns:p14="http://schemas.microsoft.com/office/powerpoint/2010/main" spd="slow">
     <p:fade/>
   </p:transition>
 </p:sld>
@@ -14514,7 +14558,7 @@
   <p:clrMapOvr>
     <a:masterClrMapping/>
   </p:clrMapOvr>
-  <p:transition spd="slow">
+  <p:transition xmlns:p14="http://schemas.microsoft.com/office/powerpoint/2010/main" spd="slow">
     <p:fade/>
   </p:transition>
 </p:sld>
@@ -14954,7 +14998,7 @@
   </a:extraClrSchemeLst>
   <a:extLst>
     <a:ext uri="{05A4C25C-085E-4340-85A3-A5531E510DB2}">
-      <thm15:themeFamily xmlns:thm15="http://schemas.microsoft.com/office/thememl/2012/main" name="Theme1" id="{7F297723-AB9E-4B6A-80BE-E623DE086D45}" vid="{A35D9E3A-7FAE-4300-9595-1F0B66D59BA3}"/>
+      <thm15:themeFamily xmlns:thm15="http://schemas.microsoft.com/office/thememl/2012/main" xmlns="" name="Theme1" id="{7F297723-AB9E-4B6A-80BE-E623DE086D45}" vid="{A35D9E3A-7FAE-4300-9595-1F0B66D59BA3}"/>
     </a:ext>
   </a:extLst>
 </a:theme>

</xml_diff>